<commit_message>
SLIDESCLOUDDOC-92 The article "Working with Text Portions" is updated and 4 articles are added
The article "Working with Text Portions" is updated.

The following articles are added:
- "Get Text Portion Properties"
- "Create a New Text Portion"
- "Update Text Portions"
- "Delete Text Portions"

Pictures in the following articles are corrected:
"Get Text Portion Properties", "Create a New Paragraph", "Delete Paragraphs", "Get Paragraph Properties", and "Update Paragraphs".
</commit_message>
<xml_diff>
--- a/slides/developer-guide/working-with-shapes/working-with-shapes-on-special-slides/working-with-paragraphs-on-a-special-slide/create-a-new-paragraph-on-a-special-slide/MyPresentation.pptx
+++ b/slides/developer-guide/working-with-shapes/working-with-shapes-on-special-slides/working-with-paragraphs-on-a-special-slide/create-a-new-paragraph-on-a-special-slide/MyPresentation.pptx
@@ -300,7 +300,7 @@
           <a:p>
             <a:fld id="{60EEB316-38BF-4E8F-9FE9-E4C90A259C5B}" type="datetimeFigureOut">
               <a:rPr lang="ru-RU" smtClean="0"/>
-              <a:t>08.04.2024</a:t>
+              <a:t>15.04.2024</a:t>
             </a:fld>
             <a:endParaRPr lang="ru-RU"/>
           </a:p>
@@ -541,7 +541,7 @@
           <a:p>
             <a:fld id="{60EEB316-38BF-4E8F-9FE9-E4C90A259C5B}" type="datetimeFigureOut">
               <a:rPr lang="ru-RU" smtClean="0"/>
-              <a:t>08.04.2024</a:t>
+              <a:t>15.04.2024</a:t>
             </a:fld>
             <a:endParaRPr lang="ru-RU"/>
           </a:p>
@@ -782,7 +782,7 @@
           <a:p>
             <a:fld id="{60EEB316-38BF-4E8F-9FE9-E4C90A259C5B}" type="datetimeFigureOut">
               <a:rPr lang="ru-RU" smtClean="0"/>
-              <a:t>08.04.2024</a:t>
+              <a:t>15.04.2024</a:t>
             </a:fld>
             <a:endParaRPr lang="ru-RU"/>
           </a:p>
@@ -1089,7 +1089,7 @@
           <a:p>
             <a:fld id="{60EEB316-38BF-4E8F-9FE9-E4C90A259C5B}" type="datetimeFigureOut">
               <a:rPr lang="ru-RU" smtClean="0"/>
-              <a:t>08.04.2024</a:t>
+              <a:t>15.04.2024</a:t>
             </a:fld>
             <a:endParaRPr lang="ru-RU"/>
           </a:p>
@@ -1396,7 +1396,7 @@
           <a:p>
             <a:fld id="{60EEB316-38BF-4E8F-9FE9-E4C90A259C5B}" type="datetimeFigureOut">
               <a:rPr lang="ru-RU" smtClean="0"/>
-              <a:t>08.04.2024</a:t>
+              <a:t>15.04.2024</a:t>
             </a:fld>
             <a:endParaRPr lang="ru-RU"/>
           </a:p>
@@ -1851,7 +1851,7 @@
           <a:p>
             <a:fld id="{60EEB316-38BF-4E8F-9FE9-E4C90A259C5B}" type="datetimeFigureOut">
               <a:rPr lang="ru-RU" smtClean="0"/>
-              <a:t>08.04.2024</a:t>
+              <a:t>15.04.2024</a:t>
             </a:fld>
             <a:endParaRPr lang="ru-RU"/>
           </a:p>
@@ -2026,7 +2026,7 @@
           <a:p>
             <a:fld id="{60EEB316-38BF-4E8F-9FE9-E4C90A259C5B}" type="datetimeFigureOut">
               <a:rPr lang="ru-RU" smtClean="0"/>
-              <a:t>08.04.2024</a:t>
+              <a:t>15.04.2024</a:t>
             </a:fld>
             <a:endParaRPr lang="ru-RU"/>
           </a:p>
@@ -2164,7 +2164,7 @@
           <a:p>
             <a:fld id="{60EEB316-38BF-4E8F-9FE9-E4C90A259C5B}" type="datetimeFigureOut">
               <a:rPr lang="ru-RU" smtClean="0"/>
-              <a:t>08.04.2024</a:t>
+              <a:t>15.04.2024</a:t>
             </a:fld>
             <a:endParaRPr lang="ru-RU"/>
           </a:p>
@@ -2511,7 +2511,7 @@
           <a:p>
             <a:fld id="{60EEB316-38BF-4E8F-9FE9-E4C90A259C5B}" type="datetimeFigureOut">
               <a:rPr lang="ru-RU" smtClean="0"/>
-              <a:t>08.04.2024</a:t>
+              <a:t>15.04.2024</a:t>
             </a:fld>
             <a:endParaRPr lang="ru-RU"/>
           </a:p>
@@ -2834,7 +2834,7 @@
           <a:p>
             <a:fld id="{60EEB316-38BF-4E8F-9FE9-E4C90A259C5B}" type="datetimeFigureOut">
               <a:rPr lang="ru-RU" smtClean="0"/>
-              <a:t>08.04.2024</a:t>
+              <a:t>15.04.2024</a:t>
             </a:fld>
             <a:endParaRPr lang="ru-RU"/>
           </a:p>
@@ -3017,8 +3017,12 @@
           </a:p>
           <a:p>
             <a:r>
+              <a:rPr lang="en-US"/>
+              <a:t>This is </a:t>
+            </a:r>
+            <a:r>
               <a:rPr lang="en-US" dirty="0"/>
-              <a:t>This in the second paragraph.</a:t>
+              <a:t>the second paragraph.</a:t>
             </a:r>
             <a:endParaRPr lang="en-US" i="1" dirty="0"/>
           </a:p>

</xml_diff>